<commit_message>
Renamed release- to rel-
</commit_message>
<xml_diff>
--- a/images/ImageSource.pptx
+++ b/images/ImageSource.pptx
@@ -264,7 +264,7 @@
           <a:p>
             <a:fld id="{5ABA4AFB-D23C-48E1-8889-69669F6BC2C0}" type="datetimeFigureOut">
               <a:rPr lang="en-US" smtClean="0"/>
-              <a:t>3/17/2020</a:t>
+              <a:t>4/20/2020</a:t>
             </a:fld>
             <a:endParaRPr lang="en-US"/>
           </a:p>
@@ -462,7 +462,7 @@
           <a:p>
             <a:fld id="{5ABA4AFB-D23C-48E1-8889-69669F6BC2C0}" type="datetimeFigureOut">
               <a:rPr lang="en-US" smtClean="0"/>
-              <a:t>3/17/2020</a:t>
+              <a:t>4/20/2020</a:t>
             </a:fld>
             <a:endParaRPr lang="en-US"/>
           </a:p>
@@ -670,7 +670,7 @@
           <a:p>
             <a:fld id="{5ABA4AFB-D23C-48E1-8889-69669F6BC2C0}" type="datetimeFigureOut">
               <a:rPr lang="en-US" smtClean="0"/>
-              <a:t>3/17/2020</a:t>
+              <a:t>4/20/2020</a:t>
             </a:fld>
             <a:endParaRPr lang="en-US"/>
           </a:p>
@@ -868,7 +868,7 @@
           <a:p>
             <a:fld id="{5ABA4AFB-D23C-48E1-8889-69669F6BC2C0}" type="datetimeFigureOut">
               <a:rPr lang="en-US" smtClean="0"/>
-              <a:t>3/17/2020</a:t>
+              <a:t>4/20/2020</a:t>
             </a:fld>
             <a:endParaRPr lang="en-US"/>
           </a:p>
@@ -1143,7 +1143,7 @@
           <a:p>
             <a:fld id="{5ABA4AFB-D23C-48E1-8889-69669F6BC2C0}" type="datetimeFigureOut">
               <a:rPr lang="en-US" smtClean="0"/>
-              <a:t>3/17/2020</a:t>
+              <a:t>4/20/2020</a:t>
             </a:fld>
             <a:endParaRPr lang="en-US"/>
           </a:p>
@@ -1408,7 +1408,7 @@
           <a:p>
             <a:fld id="{5ABA4AFB-D23C-48E1-8889-69669F6BC2C0}" type="datetimeFigureOut">
               <a:rPr lang="en-US" smtClean="0"/>
-              <a:t>3/17/2020</a:t>
+              <a:t>4/20/2020</a:t>
             </a:fld>
             <a:endParaRPr lang="en-US"/>
           </a:p>
@@ -1820,7 +1820,7 @@
           <a:p>
             <a:fld id="{5ABA4AFB-D23C-48E1-8889-69669F6BC2C0}" type="datetimeFigureOut">
               <a:rPr lang="en-US" smtClean="0"/>
-              <a:t>3/17/2020</a:t>
+              <a:t>4/20/2020</a:t>
             </a:fld>
             <a:endParaRPr lang="en-US"/>
           </a:p>
@@ -1961,7 +1961,7 @@
           <a:p>
             <a:fld id="{5ABA4AFB-D23C-48E1-8889-69669F6BC2C0}" type="datetimeFigureOut">
               <a:rPr lang="en-US" smtClean="0"/>
-              <a:t>3/17/2020</a:t>
+              <a:t>4/20/2020</a:t>
             </a:fld>
             <a:endParaRPr lang="en-US"/>
           </a:p>
@@ -2074,7 +2074,7 @@
           <a:p>
             <a:fld id="{5ABA4AFB-D23C-48E1-8889-69669F6BC2C0}" type="datetimeFigureOut">
               <a:rPr lang="en-US" smtClean="0"/>
-              <a:t>3/17/2020</a:t>
+              <a:t>4/20/2020</a:t>
             </a:fld>
             <a:endParaRPr lang="en-US"/>
           </a:p>
@@ -2385,7 +2385,7 @@
           <a:p>
             <a:fld id="{5ABA4AFB-D23C-48E1-8889-69669F6BC2C0}" type="datetimeFigureOut">
               <a:rPr lang="en-US" smtClean="0"/>
-              <a:t>3/17/2020</a:t>
+              <a:t>4/20/2020</a:t>
             </a:fld>
             <a:endParaRPr lang="en-US"/>
           </a:p>
@@ -2673,7 +2673,7 @@
           <a:p>
             <a:fld id="{5ABA4AFB-D23C-48E1-8889-69669F6BC2C0}" type="datetimeFigureOut">
               <a:rPr lang="en-US" smtClean="0"/>
-              <a:t>3/17/2020</a:t>
+              <a:t>4/20/2020</a:t>
             </a:fld>
             <a:endParaRPr lang="en-US"/>
           </a:p>
@@ -2914,7 +2914,7 @@
           <a:p>
             <a:fld id="{5ABA4AFB-D23C-48E1-8889-69669F6BC2C0}" type="datetimeFigureOut">
               <a:rPr lang="en-US" smtClean="0"/>
-              <a:t>3/17/2020</a:t>
+              <a:t>4/20/2020</a:t>
             </a:fld>
             <a:endParaRPr lang="en-US"/>
           </a:p>
@@ -5555,7 +5555,7 @@
                   <a:schemeClr val="tx1"/>
                 </a:solidFill>
               </a:rPr>
-              <a:t>release-mkt2</a:t>
+              <a:t>rele-mkt2</a:t>
             </a:r>
           </a:p>
         </p:txBody>
@@ -5613,7 +5613,7 @@
                   <a:schemeClr val="tx1"/>
                 </a:solidFill>
               </a:rPr>
-              <a:t>release-mkt1</a:t>
+              <a:t>rel-mkt1</a:t>
             </a:r>
           </a:p>
         </p:txBody>
@@ -7390,7 +7390,7 @@
                   <a:schemeClr val="tx1"/>
                 </a:solidFill>
               </a:rPr>
-              <a:t>release-mkt2</a:t>
+              <a:t>rel-mkt2</a:t>
             </a:r>
           </a:p>
         </p:txBody>
@@ -7448,7 +7448,7 @@
                   <a:schemeClr val="tx1"/>
                 </a:solidFill>
               </a:rPr>
-              <a:t>release-mkt1</a:t>
+              <a:t>rel-mkt1</a:t>
             </a:r>
           </a:p>
         </p:txBody>

</xml_diff>